<commit_message>
update week 10 and 11
</commit_message>
<xml_diff>
--- a/Week 11/Week11.pptx
+++ b/Week 11/Week11.pptx
@@ -11,8 +11,9 @@
     <p:sldId id="269" r:id="rId5"/>
     <p:sldId id="272" r:id="rId6"/>
     <p:sldId id="273" r:id="rId7"/>
-    <p:sldId id="275" r:id="rId8"/>
-    <p:sldId id="268" r:id="rId9"/>
+    <p:sldId id="277" r:id="rId8"/>
+    <p:sldId id="275" r:id="rId9"/>
+    <p:sldId id="268" r:id="rId10"/>
   </p:sldIdLst>
   <p:sldSz cx="12192000" cy="6858000"/>
   <p:notesSz cx="6858000" cy="9144000"/>
@@ -248,7 +249,7 @@
           <a:p>
             <a:fld id="{C764DE79-268F-4C1A-8933-263129D2AF90}" type="datetimeFigureOut">
               <a:rPr lang="en-US" dirty="0"/>
-              <a:t>9/4/2023</a:t>
+              <a:t>9/5/2023</a:t>
             </a:fld>
             <a:endParaRPr lang="en-US"/>
           </a:p>
@@ -416,7 +417,7 @@
           <a:p>
             <a:fld id="{C764DE79-268F-4C1A-8933-263129D2AF90}" type="datetimeFigureOut">
               <a:rPr lang="en-US" dirty="0"/>
-              <a:t>9/4/2023</a:t>
+              <a:t>9/5/2023</a:t>
             </a:fld>
             <a:endParaRPr lang="en-US"/>
           </a:p>
@@ -594,7 +595,7 @@
           <a:p>
             <a:fld id="{C764DE79-268F-4C1A-8933-263129D2AF90}" type="datetimeFigureOut">
               <a:rPr lang="en-US" dirty="0"/>
-              <a:t>9/4/2023</a:t>
+              <a:t>9/5/2023</a:t>
             </a:fld>
             <a:endParaRPr lang="en-US"/>
           </a:p>
@@ -762,7 +763,7 @@
           <a:p>
             <a:fld id="{C764DE79-268F-4C1A-8933-263129D2AF90}" type="datetimeFigureOut">
               <a:rPr lang="en-US" dirty="0"/>
-              <a:t>9/4/2023</a:t>
+              <a:t>9/5/2023</a:t>
             </a:fld>
             <a:endParaRPr lang="en-US"/>
           </a:p>
@@ -1007,7 +1008,7 @@
           <a:p>
             <a:fld id="{C764DE79-268F-4C1A-8933-263129D2AF90}" type="datetimeFigureOut">
               <a:rPr lang="en-US" dirty="0"/>
-              <a:t>9/4/2023</a:t>
+              <a:t>9/5/2023</a:t>
             </a:fld>
             <a:endParaRPr lang="en-US"/>
           </a:p>
@@ -1236,7 +1237,7 @@
           <a:p>
             <a:fld id="{C764DE79-268F-4C1A-8933-263129D2AF90}" type="datetimeFigureOut">
               <a:rPr lang="en-US" dirty="0"/>
-              <a:t>9/4/2023</a:t>
+              <a:t>9/5/2023</a:t>
             </a:fld>
             <a:endParaRPr lang="en-US"/>
           </a:p>
@@ -1600,7 +1601,7 @@
           <a:p>
             <a:fld id="{C764DE79-268F-4C1A-8933-263129D2AF90}" type="datetimeFigureOut">
               <a:rPr lang="en-US" dirty="0"/>
-              <a:t>9/4/2023</a:t>
+              <a:t>9/5/2023</a:t>
             </a:fld>
             <a:endParaRPr lang="en-US"/>
           </a:p>
@@ -1717,7 +1718,7 @@
           <a:p>
             <a:fld id="{C764DE79-268F-4C1A-8933-263129D2AF90}" type="datetimeFigureOut">
               <a:rPr lang="en-US" dirty="0"/>
-              <a:t>9/4/2023</a:t>
+              <a:t>9/5/2023</a:t>
             </a:fld>
             <a:endParaRPr lang="en-US"/>
           </a:p>
@@ -1812,7 +1813,7 @@
           <a:p>
             <a:fld id="{C764DE79-268F-4C1A-8933-263129D2AF90}" type="datetimeFigureOut">
               <a:rPr lang="en-US" dirty="0"/>
-              <a:t>9/4/2023</a:t>
+              <a:t>9/5/2023</a:t>
             </a:fld>
             <a:endParaRPr lang="en-US"/>
           </a:p>
@@ -2087,7 +2088,7 @@
           <a:p>
             <a:fld id="{C764DE79-268F-4C1A-8933-263129D2AF90}" type="datetimeFigureOut">
               <a:rPr lang="en-US" dirty="0"/>
-              <a:t>9/4/2023</a:t>
+              <a:t>9/5/2023</a:t>
             </a:fld>
             <a:endParaRPr lang="en-US"/>
           </a:p>
@@ -2342,7 +2343,7 @@
           <a:p>
             <a:fld id="{C764DE79-268F-4C1A-8933-263129D2AF90}" type="datetimeFigureOut">
               <a:rPr lang="en-US" dirty="0"/>
-              <a:t>9/4/2023</a:t>
+              <a:t>9/5/2023</a:t>
             </a:fld>
             <a:endParaRPr lang="en-US"/>
           </a:p>
@@ -2553,7 +2554,7 @@
           <a:p>
             <a:fld id="{C764DE79-268F-4C1A-8933-263129D2AF90}" type="datetimeFigureOut">
               <a:rPr lang="en-US" dirty="0"/>
-              <a:t>9/4/2023</a:t>
+              <a:t>9/5/2023</a:t>
             </a:fld>
             <a:endParaRPr lang="en-US"/>
           </a:p>
@@ -4360,6 +4361,148 @@
               <a:t>	</a:t>
             </a:r>
             <a:r>
+              <a:rPr lang="en-US" sz="17600" dirty="0" err="1">
+                <a:solidFill>
+                  <a:srgbClr val="FF6600"/>
+                </a:solidFill>
+              </a:rPr>
+              <a:t>Textcloud</a:t>
+            </a:r>
+            <a:r>
+              <a:rPr lang="en-US" sz="17600" dirty="0">
+                <a:solidFill>
+                  <a:srgbClr val="FF6600"/>
+                </a:solidFill>
+              </a:rPr>
+              <a:t> of Common Words</a:t>
+            </a:r>
+          </a:p>
+        </p:txBody>
+      </p:sp>
+      <p:pic>
+        <p:nvPicPr>
+          <p:cNvPr id="4" name="Picture 3">
+            <a:extLst>
+              <a:ext uri="{FF2B5EF4-FFF2-40B4-BE49-F238E27FC236}">
+                <a16:creationId xmlns:a16="http://schemas.microsoft.com/office/drawing/2014/main" id="{88B705E2-6685-8C0B-974C-F28A633BFD05}"/>
+              </a:ext>
+            </a:extLst>
+          </p:cNvPr>
+          <p:cNvPicPr>
+            <a:picLocks noChangeAspect="1"/>
+          </p:cNvPicPr>
+          <p:nvPr/>
+        </p:nvPicPr>
+        <p:blipFill>
+          <a:blip r:embed="rId2"/>
+          <a:stretch>
+            <a:fillRect/>
+          </a:stretch>
+        </p:blipFill>
+        <p:spPr>
+          <a:xfrm>
+            <a:off x="557514" y="2040187"/>
+            <a:ext cx="10910238" cy="2777626"/>
+          </a:xfrm>
+          <a:prstGeom prst="rect">
+            <a:avLst/>
+          </a:prstGeom>
+        </p:spPr>
+      </p:pic>
+    </p:spTree>
+    <p:extLst>
+      <p:ext uri="{BB962C8B-B14F-4D97-AF65-F5344CB8AC3E}">
+        <p14:creationId xmlns:p14="http://schemas.microsoft.com/office/powerpoint/2010/main" val="2725487789"/>
+      </p:ext>
+    </p:extLst>
+  </p:cSld>
+  <p:clrMapOvr>
+    <a:masterClrMapping/>
+  </p:clrMapOvr>
+</p:sld>
+</file>
+
+<file path=ppt/slides/slide8.xml><?xml version="1.0" encoding="utf-8"?>
+<p:sld xmlns:a="http://schemas.openxmlformats.org/drawingml/2006/main" xmlns:r="http://schemas.openxmlformats.org/officeDocument/2006/relationships" xmlns:p="http://schemas.openxmlformats.org/presentationml/2006/main">
+  <p:cSld>
+    <p:spTree>
+      <p:nvGrpSpPr>
+        <p:cNvPr id="1" name=""/>
+        <p:cNvGrpSpPr/>
+        <p:nvPr/>
+      </p:nvGrpSpPr>
+      <p:grpSpPr>
+        <a:xfrm>
+          <a:off x="0" y="0"/>
+          <a:ext cx="0" cy="0"/>
+          <a:chOff x="0" y="0"/>
+          <a:chExt cx="0" cy="0"/>
+        </a:xfrm>
+      </p:grpSpPr>
+      <p:sp>
+        <p:nvSpPr>
+          <p:cNvPr id="6" name="Title 1">
+            <a:extLst>
+              <a:ext uri="{FF2B5EF4-FFF2-40B4-BE49-F238E27FC236}">
+                <a16:creationId xmlns:a16="http://schemas.microsoft.com/office/drawing/2014/main" id="{8DEBE404-8654-ABEC-F427-CB3B2BB758E7}"/>
+              </a:ext>
+            </a:extLst>
+          </p:cNvPr>
+          <p:cNvSpPr txBox="1">
+            <a:spLocks/>
+          </p:cNvSpPr>
+          <p:nvPr/>
+        </p:nvSpPr>
+        <p:spPr>
+          <a:xfrm rot="5400000">
+            <a:off x="5567492" y="-5567495"/>
+            <a:ext cx="1057013" cy="12192003"/>
+          </a:xfrm>
+          <a:prstGeom prst="rect">
+            <a:avLst/>
+          </a:prstGeom>
+          <a:solidFill>
+            <a:srgbClr val="3B3B3B"/>
+          </a:solidFill>
+        </p:spPr>
+        <p:txBody>
+          <a:bodyPr vert="vert270" lIns="91440" tIns="45720" rIns="91440" bIns="45720" rtlCol="0" anchor="t" anchorCtr="0">
+            <a:normAutofit fontScale="25000" lnSpcReduction="20000"/>
+          </a:bodyPr>
+          <a:lstStyle>
+            <a:lvl1pPr algn="l" defTabSz="914400" rtl="0" eaLnBrk="1" latinLnBrk="0" hangingPunct="1">
+              <a:lnSpc>
+                <a:spcPct val="90000"/>
+              </a:lnSpc>
+              <a:spcBef>
+                <a:spcPct val="0"/>
+              </a:spcBef>
+              <a:buNone/>
+              <a:defRPr sz="4400" kern="1200">
+                <a:solidFill>
+                  <a:schemeClr val="tx1"/>
+                </a:solidFill>
+                <a:latin typeface="+mj-lt"/>
+                <a:ea typeface="+mj-ea"/>
+                <a:cs typeface="+mj-cs"/>
+              </a:defRPr>
+            </a:lvl1pPr>
+          </a:lstStyle>
+          <a:p>
+            <a:br>
+              <a:rPr lang="en-US" dirty="0"/>
+            </a:br>
+            <a:br>
+              <a:rPr lang="en-US" dirty="0"/>
+            </a:br>
+            <a:br>
+              <a:rPr lang="en-US" dirty="0"/>
+            </a:br>
+            <a:r>
+              <a:rPr lang="en-US" dirty="0"/>
+              <a:t>	</a:t>
+            </a:r>
+            <a:r>
               <a:rPr lang="en-US" sz="17600" dirty="0">
                 <a:solidFill>
                   <a:srgbClr val="FF6600"/>
@@ -4664,7 +4807,7 @@
 </p:sld>
 </file>
 
-<file path=ppt/slides/slide8.xml><?xml version="1.0" encoding="utf-8"?>
+<file path=ppt/slides/slide9.xml><?xml version="1.0" encoding="utf-8"?>
 <p:sld xmlns:a="http://schemas.openxmlformats.org/drawingml/2006/main" xmlns:r="http://schemas.openxmlformats.org/officeDocument/2006/relationships" xmlns:p="http://schemas.openxmlformats.org/presentationml/2006/main">
   <p:cSld>
     <p:spTree>

</xml_diff>